<commit_message>
Update RandomColor and SavePosition
Clean up randomcolor and saveposition
</commit_message>
<xml_diff>
--- a/Serialization/Lecture.pptx
+++ b/Serialization/Lecture.pptx
@@ -5,7 +5,7 @@
     <p:sldMasterId id="2147483673" r:id="rId1"/>
   </p:sldMasterIdLst>
   <p:notesMasterIdLst>
-    <p:notesMasterId r:id="rId9"/>
+    <p:notesMasterId r:id="rId11"/>
   </p:notesMasterIdLst>
   <p:sldIdLst>
     <p:sldId id="256" r:id="rId2"/>
@@ -15,6 +15,8 @@
     <p:sldId id="260" r:id="rId6"/>
     <p:sldId id="261" r:id="rId7"/>
     <p:sldId id="262" r:id="rId8"/>
+    <p:sldId id="263" r:id="rId9"/>
+    <p:sldId id="264" r:id="rId10"/>
   </p:sldIdLst>
   <p:sldSz cx="12192000" cy="6858000"/>
   <p:notesSz cx="6858000" cy="9144000"/>
@@ -1584,6 +1586,210 @@
     <p:extLst>
       <p:ext uri="{BB962C8B-B14F-4D97-AF65-F5344CB8AC3E}">
         <p14:creationId xmlns:p14="http://schemas.microsoft.com/office/powerpoint/2010/main" val="496413022"/>
+      </p:ext>
+    </p:extLst>
+  </p:cSld>
+  <p:clrMapOvr>
+    <a:masterClrMapping/>
+  </p:clrMapOvr>
+</p:notes>
+</file>
+
+<file path=ppt/notesSlides/notesSlide7.xml><?xml version="1.0" encoding="utf-8"?>
+<p:notes xmlns:a="http://schemas.openxmlformats.org/drawingml/2006/main" xmlns:r="http://schemas.openxmlformats.org/officeDocument/2006/relationships" xmlns:p="http://schemas.openxmlformats.org/presentationml/2006/main">
+  <p:cSld>
+    <p:spTree>
+      <p:nvGrpSpPr>
+        <p:cNvPr id="1" name=""/>
+        <p:cNvGrpSpPr/>
+        <p:nvPr/>
+      </p:nvGrpSpPr>
+      <p:grpSpPr>
+        <a:xfrm>
+          <a:off x="0" y="0"/>
+          <a:ext cx="0" cy="0"/>
+          <a:chOff x="0" y="0"/>
+          <a:chExt cx="0" cy="0"/>
+        </a:xfrm>
+      </p:grpSpPr>
+      <p:sp>
+        <p:nvSpPr>
+          <p:cNvPr id="2" name="Slide Image Placeholder 1"/>
+          <p:cNvSpPr>
+            <a:spLocks noGrp="1" noRot="1" noChangeAspect="1"/>
+          </p:cNvSpPr>
+          <p:nvPr>
+            <p:ph type="sldImg"/>
+          </p:nvPr>
+        </p:nvSpPr>
+        <p:spPr/>
+      </p:sp>
+      <p:sp>
+        <p:nvSpPr>
+          <p:cNvPr id="3" name="Notes Placeholder 2"/>
+          <p:cNvSpPr>
+            <a:spLocks noGrp="1"/>
+          </p:cNvSpPr>
+          <p:nvPr>
+            <p:ph type="body" idx="1"/>
+          </p:nvPr>
+        </p:nvSpPr>
+        <p:spPr/>
+        <p:txBody>
+          <a:bodyPr/>
+          <a:lstStyle/>
+          <a:p>
+            <a:r>
+              <a:rPr lang="en-US" dirty="0"/>
+              <a:t>So now, we’re going to implement a visual example of serialization. We have a box that we can freely move around the screen, and every time we play the scene, the box is going to be a different color. However, we are going to implement a save function that allows us to serialize the location and the color of the box, so after we end our game play, we can restart the scene, and the box will still be the same color and in the same location as the last time we had it open.</a:t>
+            </a:r>
+          </a:p>
+        </p:txBody>
+      </p:sp>
+      <p:sp>
+        <p:nvSpPr>
+          <p:cNvPr id="4" name="Slide Number Placeholder 3"/>
+          <p:cNvSpPr>
+            <a:spLocks noGrp="1"/>
+          </p:cNvSpPr>
+          <p:nvPr>
+            <p:ph type="sldNum" sz="quarter" idx="5"/>
+          </p:nvPr>
+        </p:nvSpPr>
+        <p:spPr/>
+        <p:txBody>
+          <a:bodyPr/>
+          <a:lstStyle/>
+          <a:p>
+            <a:fld id="{926A4D28-551C-4E4A-9CE4-840CFB3B2FC0}" type="slidenum">
+              <a:rPr lang="en-US" smtClean="0"/>
+              <a:t>8</a:t>
+            </a:fld>
+            <a:endParaRPr lang="en-US"/>
+          </a:p>
+        </p:txBody>
+      </p:sp>
+    </p:spTree>
+    <p:extLst>
+      <p:ext uri="{BB962C8B-B14F-4D97-AF65-F5344CB8AC3E}">
+        <p14:creationId xmlns:p14="http://schemas.microsoft.com/office/powerpoint/2010/main" val="1016973399"/>
+      </p:ext>
+    </p:extLst>
+  </p:cSld>
+  <p:clrMapOvr>
+    <a:masterClrMapping/>
+  </p:clrMapOvr>
+</p:notes>
+</file>
+
+<file path=ppt/notesSlides/notesSlide8.xml><?xml version="1.0" encoding="utf-8"?>
+<p:notes xmlns:a="http://schemas.openxmlformats.org/drawingml/2006/main" xmlns:r="http://schemas.openxmlformats.org/officeDocument/2006/relationships" xmlns:p="http://schemas.openxmlformats.org/presentationml/2006/main">
+  <p:cSld>
+    <p:spTree>
+      <p:nvGrpSpPr>
+        <p:cNvPr id="1" name=""/>
+        <p:cNvGrpSpPr/>
+        <p:nvPr/>
+      </p:nvGrpSpPr>
+      <p:grpSpPr>
+        <a:xfrm>
+          <a:off x="0" y="0"/>
+          <a:ext cx="0" cy="0"/>
+          <a:chOff x="0" y="0"/>
+          <a:chExt cx="0" cy="0"/>
+        </a:xfrm>
+      </p:grpSpPr>
+      <p:sp>
+        <p:nvSpPr>
+          <p:cNvPr id="2" name="Slide Image Placeholder 1"/>
+          <p:cNvSpPr>
+            <a:spLocks noGrp="1" noRot="1" noChangeAspect="1"/>
+          </p:cNvSpPr>
+          <p:nvPr>
+            <p:ph type="sldImg"/>
+          </p:nvPr>
+        </p:nvSpPr>
+        <p:spPr/>
+      </p:sp>
+      <p:sp>
+        <p:nvSpPr>
+          <p:cNvPr id="3" name="Notes Placeholder 2"/>
+          <p:cNvSpPr>
+            <a:spLocks noGrp="1"/>
+          </p:cNvSpPr>
+          <p:nvPr>
+            <p:ph type="body" idx="1"/>
+          </p:nvPr>
+        </p:nvSpPr>
+        <p:spPr/>
+        <p:txBody>
+          <a:bodyPr/>
+          <a:lstStyle/>
+          <a:p>
+            <a:r>
+              <a:rPr lang="en-US" dirty="0"/>
+              <a:t>So, first things first: I want you to create a serialized class in </a:t>
+            </a:r>
+            <a:r>
+              <a:rPr lang="en-US" dirty="0" err="1"/>
+              <a:t>SavePosition.cs</a:t>
+            </a:r>
+            <a:r>
+              <a:rPr lang="en-US" dirty="0"/>
+              <a:t> that contains floats for the three different </a:t>
+            </a:r>
+            <a:r>
+              <a:rPr lang="en-US" dirty="0" err="1"/>
+              <a:t>axees</a:t>
+            </a:r>
+            <a:r>
+              <a:rPr lang="en-US" dirty="0"/>
+              <a:t>.</a:t>
+            </a:r>
+          </a:p>
+          <a:p>
+            <a:endParaRPr lang="en-US" dirty="0"/>
+          </a:p>
+          <a:p>
+            <a:r>
+              <a:rPr lang="en-US" dirty="0"/>
+              <a:t>Side note: Giving my students problems throughout the lectures is the way that I try to encourage participation and allows students to ask questions about something they might not understand. I generally give them a few minutes to figure it out, and then we go over </a:t>
+            </a:r>
+            <a:r>
+              <a:rPr lang="en-US"/>
+              <a:t>the answer. </a:t>
+            </a:r>
+            <a:endParaRPr lang="en-US" dirty="0"/>
+          </a:p>
+        </p:txBody>
+      </p:sp>
+      <p:sp>
+        <p:nvSpPr>
+          <p:cNvPr id="4" name="Slide Number Placeholder 3"/>
+          <p:cNvSpPr>
+            <a:spLocks noGrp="1"/>
+          </p:cNvSpPr>
+          <p:nvPr>
+            <p:ph type="sldNum" sz="quarter" idx="5"/>
+          </p:nvPr>
+        </p:nvSpPr>
+        <p:spPr/>
+        <p:txBody>
+          <a:bodyPr/>
+          <a:lstStyle/>
+          <a:p>
+            <a:fld id="{926A4D28-551C-4E4A-9CE4-840CFB3B2FC0}" type="slidenum">
+              <a:rPr lang="en-US" smtClean="0"/>
+              <a:t>9</a:t>
+            </a:fld>
+            <a:endParaRPr lang="en-US"/>
+          </a:p>
+        </p:txBody>
+      </p:sp>
+    </p:spTree>
+    <p:extLst>
+      <p:ext uri="{BB962C8B-B14F-4D97-AF65-F5344CB8AC3E}">
+        <p14:creationId xmlns:p14="http://schemas.microsoft.com/office/powerpoint/2010/main" val="3595875894"/>
       </p:ext>
     </p:extLst>
   </p:cSld>
@@ -8037,7 +8243,7 @@
         </p:blipFill>
         <p:spPr>
           <a:xfrm>
-            <a:off x="6484375" y="3171925"/>
+            <a:off x="6484375" y="3953590"/>
             <a:ext cx="4076700" cy="1123950"/>
           </a:xfrm>
           <a:prstGeom prst="rect">
@@ -8138,7 +8344,7 @@
         </p:blipFill>
         <p:spPr>
           <a:xfrm>
-            <a:off x="4998475" y="938058"/>
+            <a:off x="4860067" y="1625144"/>
             <a:ext cx="7048500" cy="1619250"/>
           </a:xfrm>
           <a:prstGeom prst="rect">
@@ -8150,6 +8356,272 @@
     <p:extLst>
       <p:ext uri="{BB962C8B-B14F-4D97-AF65-F5344CB8AC3E}">
         <p14:creationId xmlns:p14="http://schemas.microsoft.com/office/powerpoint/2010/main" val="1835248495"/>
+      </p:ext>
+    </p:extLst>
+  </p:cSld>
+  <p:clrMapOvr>
+    <a:masterClrMapping/>
+  </p:clrMapOvr>
+</p:sld>
+</file>
+
+<file path=ppt/slides/slide8.xml><?xml version="1.0" encoding="utf-8"?>
+<p:sld xmlns:a="http://schemas.openxmlformats.org/drawingml/2006/main" xmlns:r="http://schemas.openxmlformats.org/officeDocument/2006/relationships" xmlns:p="http://schemas.openxmlformats.org/presentationml/2006/main">
+  <p:cSld>
+    <p:spTree>
+      <p:nvGrpSpPr>
+        <p:cNvPr id="1" name=""/>
+        <p:cNvGrpSpPr/>
+        <p:nvPr/>
+      </p:nvGrpSpPr>
+      <p:grpSpPr>
+        <a:xfrm>
+          <a:off x="0" y="0"/>
+          <a:ext cx="0" cy="0"/>
+          <a:chOff x="0" y="0"/>
+          <a:chExt cx="0" cy="0"/>
+        </a:xfrm>
+      </p:grpSpPr>
+      <p:sp>
+        <p:nvSpPr>
+          <p:cNvPr id="2" name="Title 1">
+            <a:extLst>
+              <a:ext uri="{FF2B5EF4-FFF2-40B4-BE49-F238E27FC236}">
+                <a16:creationId xmlns:a16="http://schemas.microsoft.com/office/drawing/2014/main" id="{52D4FC53-793D-4912-886A-48C3C4720AE9}"/>
+              </a:ext>
+            </a:extLst>
+          </p:cNvPr>
+          <p:cNvSpPr>
+            <a:spLocks noGrp="1"/>
+          </p:cNvSpPr>
+          <p:nvPr>
+            <p:ph type="title"/>
+          </p:nvPr>
+        </p:nvSpPr>
+        <p:spPr>
+          <a:xfrm>
+            <a:off x="720000" y="619201"/>
+            <a:ext cx="10728322" cy="826142"/>
+          </a:xfrm>
+        </p:spPr>
+        <p:txBody>
+          <a:bodyPr/>
+          <a:lstStyle/>
+          <a:p>
+            <a:r>
+              <a:rPr lang="en-US" dirty="0"/>
+              <a:t>Save a Game</a:t>
+            </a:r>
+          </a:p>
+        </p:txBody>
+      </p:sp>
+      <p:pic>
+        <p:nvPicPr>
+          <p:cNvPr id="5" name="Picture 4">
+            <a:extLst>
+              <a:ext uri="{FF2B5EF4-FFF2-40B4-BE49-F238E27FC236}">
+                <a16:creationId xmlns:a16="http://schemas.microsoft.com/office/drawing/2014/main" id="{CA2B01FD-FD57-48CB-99F7-6DAE3CD3534E}"/>
+              </a:ext>
+            </a:extLst>
+          </p:cNvPr>
+          <p:cNvPicPr>
+            <a:picLocks noChangeAspect="1"/>
+          </p:cNvPicPr>
+          <p:nvPr/>
+        </p:nvPicPr>
+        <p:blipFill>
+          <a:blip r:embed="rId3"/>
+          <a:stretch>
+            <a:fillRect/>
+          </a:stretch>
+        </p:blipFill>
+        <p:spPr>
+          <a:xfrm>
+            <a:off x="473936" y="1445343"/>
+            <a:ext cx="4903404" cy="2920180"/>
+          </a:xfrm>
+          <a:prstGeom prst="rect">
+            <a:avLst/>
+          </a:prstGeom>
+        </p:spPr>
+      </p:pic>
+      <p:pic>
+        <p:nvPicPr>
+          <p:cNvPr id="7" name="Picture 6">
+            <a:extLst>
+              <a:ext uri="{FF2B5EF4-FFF2-40B4-BE49-F238E27FC236}">
+                <a16:creationId xmlns:a16="http://schemas.microsoft.com/office/drawing/2014/main" id="{E2344F4C-1574-4953-A466-B33079455E89}"/>
+              </a:ext>
+            </a:extLst>
+          </p:cNvPr>
+          <p:cNvPicPr>
+            <a:picLocks noChangeAspect="1"/>
+          </p:cNvPicPr>
+          <p:nvPr/>
+        </p:nvPicPr>
+        <p:blipFill>
+          <a:blip r:embed="rId4"/>
+          <a:stretch>
+            <a:fillRect/>
+          </a:stretch>
+        </p:blipFill>
+        <p:spPr>
+          <a:xfrm>
+            <a:off x="6790982" y="1445343"/>
+            <a:ext cx="4903404" cy="2920180"/>
+          </a:xfrm>
+          <a:prstGeom prst="rect">
+            <a:avLst/>
+          </a:prstGeom>
+        </p:spPr>
+      </p:pic>
+      <p:cxnSp>
+        <p:nvCxnSpPr>
+          <p:cNvPr id="9" name="Straight Arrow Connector 8">
+            <a:extLst>
+              <a:ext uri="{FF2B5EF4-FFF2-40B4-BE49-F238E27FC236}">
+                <a16:creationId xmlns:a16="http://schemas.microsoft.com/office/drawing/2014/main" id="{A111924E-0223-48CB-A0FA-5F4ACB250F14}"/>
+              </a:ext>
+            </a:extLst>
+          </p:cNvPr>
+          <p:cNvCxnSpPr/>
+          <p:nvPr/>
+        </p:nvCxnSpPr>
+        <p:spPr>
+          <a:xfrm>
+            <a:off x="5663381" y="2905433"/>
+            <a:ext cx="737419" cy="0"/>
+          </a:xfrm>
+          <a:prstGeom prst="straightConnector1">
+            <a:avLst/>
+          </a:prstGeom>
+          <a:ln w="76200">
+            <a:tailEnd type="triangle"/>
+          </a:ln>
+        </p:spPr>
+        <p:style>
+          <a:lnRef idx="1">
+            <a:schemeClr val="accent1"/>
+          </a:lnRef>
+          <a:fillRef idx="0">
+            <a:schemeClr val="accent1"/>
+          </a:fillRef>
+          <a:effectRef idx="0">
+            <a:schemeClr val="accent1"/>
+          </a:effectRef>
+          <a:fontRef idx="minor">
+            <a:schemeClr val="tx1"/>
+          </a:fontRef>
+        </p:style>
+      </p:cxnSp>
+    </p:spTree>
+    <p:extLst>
+      <p:ext uri="{BB962C8B-B14F-4D97-AF65-F5344CB8AC3E}">
+        <p14:creationId xmlns:p14="http://schemas.microsoft.com/office/powerpoint/2010/main" val="3499902984"/>
+      </p:ext>
+    </p:extLst>
+  </p:cSld>
+  <p:clrMapOvr>
+    <a:masterClrMapping/>
+  </p:clrMapOvr>
+</p:sld>
+</file>
+
+<file path=ppt/slides/slide9.xml><?xml version="1.0" encoding="utf-8"?>
+<p:sld xmlns:a="http://schemas.openxmlformats.org/drawingml/2006/main" xmlns:r="http://schemas.openxmlformats.org/officeDocument/2006/relationships" xmlns:p="http://schemas.openxmlformats.org/presentationml/2006/main">
+  <p:cSld>
+    <p:spTree>
+      <p:nvGrpSpPr>
+        <p:cNvPr id="1" name=""/>
+        <p:cNvGrpSpPr/>
+        <p:nvPr/>
+      </p:nvGrpSpPr>
+      <p:grpSpPr>
+        <a:xfrm>
+          <a:off x="0" y="0"/>
+          <a:ext cx="0" cy="0"/>
+          <a:chOff x="0" y="0"/>
+          <a:chExt cx="0" cy="0"/>
+        </a:xfrm>
+      </p:grpSpPr>
+      <p:sp>
+        <p:nvSpPr>
+          <p:cNvPr id="2" name="Title 1">
+            <a:extLst>
+              <a:ext uri="{FF2B5EF4-FFF2-40B4-BE49-F238E27FC236}">
+                <a16:creationId xmlns:a16="http://schemas.microsoft.com/office/drawing/2014/main" id="{F1C3E580-CA91-4337-8034-13B8F3A8F2F1}"/>
+              </a:ext>
+            </a:extLst>
+          </p:cNvPr>
+          <p:cNvSpPr>
+            <a:spLocks noGrp="1"/>
+          </p:cNvSpPr>
+          <p:nvPr>
+            <p:ph type="title"/>
+          </p:nvPr>
+        </p:nvSpPr>
+        <p:spPr>
+          <a:xfrm>
+            <a:off x="720000" y="619200"/>
+            <a:ext cx="10728322" cy="708155"/>
+          </a:xfrm>
+        </p:spPr>
+        <p:txBody>
+          <a:bodyPr/>
+          <a:lstStyle/>
+          <a:p>
+            <a:r>
+              <a:rPr lang="en-US" dirty="0"/>
+              <a:t>Problem</a:t>
+            </a:r>
+          </a:p>
+        </p:txBody>
+      </p:sp>
+      <p:sp>
+        <p:nvSpPr>
+          <p:cNvPr id="3" name="Content Placeholder 2">
+            <a:extLst>
+              <a:ext uri="{FF2B5EF4-FFF2-40B4-BE49-F238E27FC236}">
+                <a16:creationId xmlns:a16="http://schemas.microsoft.com/office/drawing/2014/main" id="{76DCAE6B-A556-4BAA-8F4F-B6DC1728FEF2}"/>
+              </a:ext>
+            </a:extLst>
+          </p:cNvPr>
+          <p:cNvSpPr>
+            <a:spLocks noGrp="1"/>
+          </p:cNvSpPr>
+          <p:nvPr>
+            <p:ph idx="1"/>
+          </p:nvPr>
+        </p:nvSpPr>
+        <p:spPr>
+          <a:xfrm>
+            <a:off x="719997" y="1681317"/>
+            <a:ext cx="10728325" cy="4441620"/>
+          </a:xfrm>
+        </p:spPr>
+        <p:txBody>
+          <a:bodyPr/>
+          <a:lstStyle/>
+          <a:p>
+            <a:r>
+              <a:rPr lang="en-US" dirty="0"/>
+              <a:t>Create a serialized class in </a:t>
+            </a:r>
+            <a:r>
+              <a:rPr lang="en-US" dirty="0" err="1"/>
+              <a:t>SavePosition.cs</a:t>
+            </a:r>
+            <a:r>
+              <a:rPr lang="en-US" dirty="0"/>
+              <a:t> that contains floats for the three different axes.</a:t>
+            </a:r>
+          </a:p>
+        </p:txBody>
+      </p:sp>
+    </p:spTree>
+    <p:extLst>
+      <p:ext uri="{BB962C8B-B14F-4D97-AF65-F5344CB8AC3E}">
+        <p14:creationId xmlns:p14="http://schemas.microsoft.com/office/powerpoint/2010/main" val="2346021911"/>
       </p:ext>
     </p:extLst>
   </p:cSld>

</xml_diff>

<commit_message>
Update SavePosition and Lecture
Update SavePosition to be cleaner and added official problem and solution slide for SavePosition script
</commit_message>
<xml_diff>
--- a/Serialization/Lecture.pptx
+++ b/Serialization/Lecture.pptx
@@ -5,7 +5,7 @@
     <p:sldMasterId id="2147483673" r:id="rId1"/>
   </p:sldMasterIdLst>
   <p:notesMasterIdLst>
-    <p:notesMasterId r:id="rId12"/>
+    <p:notesMasterId r:id="rId13"/>
   </p:notesMasterIdLst>
   <p:sldIdLst>
     <p:sldId id="256" r:id="rId2"/>
@@ -18,6 +18,7 @@
     <p:sldId id="263" r:id="rId9"/>
     <p:sldId id="264" r:id="rId10"/>
     <p:sldId id="265" r:id="rId11"/>
+    <p:sldId id="266" r:id="rId12"/>
   </p:sldIdLst>
   <p:sldSz cx="12192000" cy="6858000"/>
   <p:notesSz cx="6858000" cy="9144000"/>
@@ -1729,7 +1730,7 @@
           <a:p>
             <a:r>
               <a:rPr lang="en-US" dirty="0"/>
-              <a:t>So, first things first: I want you to create a serialized class in </a:t>
+              <a:t>So, first things first: we need to create our class to store the x, y and z locations of our player. I want you to create a serialized class in </a:t>
             </a:r>
             <a:r>
               <a:rPr lang="en-US" dirty="0" err="1"/>
@@ -1786,6 +1787,109 @@
     <p:extLst>
       <p:ext uri="{BB962C8B-B14F-4D97-AF65-F5344CB8AC3E}">
         <p14:creationId xmlns:p14="http://schemas.microsoft.com/office/powerpoint/2010/main" val="3595875894"/>
+      </p:ext>
+    </p:extLst>
+  </p:cSld>
+  <p:clrMapOvr>
+    <a:masterClrMapping/>
+  </p:clrMapOvr>
+</p:notes>
+</file>
+
+<file path=ppt/notesSlides/notesSlide9.xml><?xml version="1.0" encoding="utf-8"?>
+<p:notes xmlns:a="http://schemas.openxmlformats.org/drawingml/2006/main" xmlns:r="http://schemas.openxmlformats.org/officeDocument/2006/relationships" xmlns:p="http://schemas.openxmlformats.org/presentationml/2006/main">
+  <p:cSld>
+    <p:spTree>
+      <p:nvGrpSpPr>
+        <p:cNvPr id="1" name=""/>
+        <p:cNvGrpSpPr/>
+        <p:nvPr/>
+      </p:nvGrpSpPr>
+      <p:grpSpPr>
+        <a:xfrm>
+          <a:off x="0" y="0"/>
+          <a:ext cx="0" cy="0"/>
+          <a:chOff x="0" y="0"/>
+          <a:chExt cx="0" cy="0"/>
+        </a:xfrm>
+      </p:grpSpPr>
+      <p:sp>
+        <p:nvSpPr>
+          <p:cNvPr id="2" name="Slide Image Placeholder 1"/>
+          <p:cNvSpPr>
+            <a:spLocks noGrp="1" noRot="1" noChangeAspect="1"/>
+          </p:cNvSpPr>
+          <p:nvPr>
+            <p:ph type="sldImg"/>
+          </p:nvPr>
+        </p:nvSpPr>
+        <p:spPr/>
+      </p:sp>
+      <p:sp>
+        <p:nvSpPr>
+          <p:cNvPr id="3" name="Notes Placeholder 2"/>
+          <p:cNvSpPr>
+            <a:spLocks noGrp="1"/>
+          </p:cNvSpPr>
+          <p:nvPr>
+            <p:ph type="body" idx="1"/>
+          </p:nvPr>
+        </p:nvSpPr>
+        <p:spPr/>
+        <p:txBody>
+          <a:bodyPr/>
+          <a:lstStyle/>
+          <a:p>
+            <a:r>
+              <a:rPr lang="en-US" dirty="0"/>
+              <a:t>So here is what our answer is going to look like. The floats themselves are public and primitive-- they are automatically serialized per our serialization rules, so this is all you needed to add. However, I want to point out the [</a:t>
+            </a:r>
+            <a:r>
+              <a:rPr lang="en-US" dirty="0" err="1"/>
+              <a:t>system.serializable</a:t>
+            </a:r>
+            <a:r>
+              <a:rPr lang="en-US" dirty="0"/>
+              <a:t>] attribute on line 5. We are going to be using this </a:t>
+            </a:r>
+            <a:r>
+              <a:rPr lang="en-US" dirty="0" err="1"/>
+              <a:t>SavePosition</a:t>
+            </a:r>
+            <a:r>
+              <a:rPr lang="en-US" dirty="0"/>
+              <a:t> class in our game save script because we want these floats to jump across our scripts. Therefore, we are going to make our entire class serializable using this attribute.</a:t>
+            </a:r>
+          </a:p>
+        </p:txBody>
+      </p:sp>
+      <p:sp>
+        <p:nvSpPr>
+          <p:cNvPr id="4" name="Slide Number Placeholder 3"/>
+          <p:cNvSpPr>
+            <a:spLocks noGrp="1"/>
+          </p:cNvSpPr>
+          <p:nvPr>
+            <p:ph type="sldNum" sz="quarter" idx="5"/>
+          </p:nvPr>
+        </p:nvSpPr>
+        <p:spPr/>
+        <p:txBody>
+          <a:bodyPr/>
+          <a:lstStyle/>
+          <a:p>
+            <a:fld id="{926A4D28-551C-4E4A-9CE4-840CFB3B2FC0}" type="slidenum">
+              <a:rPr lang="en-US" smtClean="0"/>
+              <a:t>10</a:t>
+            </a:fld>
+            <a:endParaRPr lang="en-US"/>
+          </a:p>
+        </p:txBody>
+      </p:sp>
+    </p:spTree>
+    <p:extLst>
+      <p:ext uri="{BB962C8B-B14F-4D97-AF65-F5344CB8AC3E}">
+        <p14:creationId xmlns:p14="http://schemas.microsoft.com/office/powerpoint/2010/main" val="2180905226"/>
       </p:ext>
     </p:extLst>
   </p:cSld>
@@ -5383,32 +5487,10 @@
           <a:bodyPr/>
           <a:lstStyle/>
           <a:p>
-            <a:endParaRPr lang="en-US"/>
-          </a:p>
-        </p:txBody>
-      </p:sp>
-      <p:sp>
-        <p:nvSpPr>
-          <p:cNvPr id="3" name="Content Placeholder 2">
-            <a:extLst>
-              <a:ext uri="{FF2B5EF4-FFF2-40B4-BE49-F238E27FC236}">
-                <a16:creationId xmlns:a16="http://schemas.microsoft.com/office/drawing/2014/main" id="{A846A474-676E-4013-8039-CC667AFB3DC3}"/>
-              </a:ext>
-            </a:extLst>
-          </p:cNvPr>
-          <p:cNvSpPr>
-            <a:spLocks noGrp="1"/>
-          </p:cNvSpPr>
-          <p:nvPr>
-            <p:ph idx="1"/>
-          </p:nvPr>
-        </p:nvSpPr>
-        <p:spPr/>
-        <p:txBody>
-          <a:bodyPr/>
-          <a:lstStyle/>
-          <a:p>
-            <a:endParaRPr lang="en-US"/>
+            <a:r>
+              <a:rPr lang="en-US" dirty="0"/>
+              <a:t>Solution</a:t>
+            </a:r>
           </a:p>
         </p:txBody>
       </p:sp>
@@ -5454,10 +5536,129 @@
           </a:p>
         </p:txBody>
       </p:sp>
+      <p:pic>
+        <p:nvPicPr>
+          <p:cNvPr id="5" name="Picture 4">
+            <a:extLst>
+              <a:ext uri="{FF2B5EF4-FFF2-40B4-BE49-F238E27FC236}">
+                <a16:creationId xmlns:a16="http://schemas.microsoft.com/office/drawing/2014/main" id="{4977476E-DADB-4EDA-A66D-A50A964DCBE5}"/>
+              </a:ext>
+            </a:extLst>
+          </p:cNvPr>
+          <p:cNvPicPr>
+            <a:picLocks noChangeAspect="1"/>
+          </p:cNvPicPr>
+          <p:nvPr/>
+        </p:nvPicPr>
+        <p:blipFill>
+          <a:blip r:embed="rId3"/>
+          <a:stretch>
+            <a:fillRect/>
+          </a:stretch>
+        </p:blipFill>
+        <p:spPr>
+          <a:xfrm>
+            <a:off x="2981171" y="1413522"/>
+            <a:ext cx="6229657" cy="4030955"/>
+          </a:xfrm>
+          <a:prstGeom prst="rect">
+            <a:avLst/>
+          </a:prstGeom>
+        </p:spPr>
+      </p:pic>
     </p:spTree>
     <p:extLst>
       <p:ext uri="{BB962C8B-B14F-4D97-AF65-F5344CB8AC3E}">
         <p14:creationId xmlns:p14="http://schemas.microsoft.com/office/powerpoint/2010/main" val="3636495811"/>
+      </p:ext>
+    </p:extLst>
+  </p:cSld>
+  <p:clrMapOvr>
+    <a:masterClrMapping/>
+  </p:clrMapOvr>
+</p:sld>
+</file>
+
+<file path=ppt/slides/slide11.xml><?xml version="1.0" encoding="utf-8"?>
+<p:sld xmlns:a="http://schemas.openxmlformats.org/drawingml/2006/main" xmlns:r="http://schemas.openxmlformats.org/officeDocument/2006/relationships" xmlns:p="http://schemas.openxmlformats.org/presentationml/2006/main">
+  <p:cSld>
+    <p:spTree>
+      <p:nvGrpSpPr>
+        <p:cNvPr id="1" name=""/>
+        <p:cNvGrpSpPr/>
+        <p:nvPr/>
+      </p:nvGrpSpPr>
+      <p:grpSpPr>
+        <a:xfrm>
+          <a:off x="0" y="0"/>
+          <a:ext cx="0" cy="0"/>
+          <a:chOff x="0" y="0"/>
+          <a:chExt cx="0" cy="0"/>
+        </a:xfrm>
+      </p:grpSpPr>
+      <p:sp>
+        <p:nvSpPr>
+          <p:cNvPr id="2" name="Title 1">
+            <a:extLst>
+              <a:ext uri="{FF2B5EF4-FFF2-40B4-BE49-F238E27FC236}">
+                <a16:creationId xmlns:a16="http://schemas.microsoft.com/office/drawing/2014/main" id="{C595D2B5-A15F-4226-A05E-D7B225FD361C}"/>
+              </a:ext>
+            </a:extLst>
+          </p:cNvPr>
+          <p:cNvSpPr>
+            <a:spLocks noGrp="1"/>
+          </p:cNvSpPr>
+          <p:nvPr>
+            <p:ph type="title"/>
+          </p:nvPr>
+        </p:nvSpPr>
+        <p:spPr>
+          <a:xfrm>
+            <a:off x="720000" y="619200"/>
+            <a:ext cx="10728322" cy="1003123"/>
+          </a:xfrm>
+        </p:spPr>
+        <p:txBody>
+          <a:bodyPr/>
+          <a:lstStyle/>
+          <a:p>
+            <a:r>
+              <a:rPr lang="en-US" dirty="0" err="1"/>
+              <a:t>PlayerController.CS</a:t>
+            </a:r>
+            <a:endParaRPr lang="en-US" dirty="0"/>
+          </a:p>
+        </p:txBody>
+      </p:sp>
+      <p:sp>
+        <p:nvSpPr>
+          <p:cNvPr id="3" name="Content Placeholder 2">
+            <a:extLst>
+              <a:ext uri="{FF2B5EF4-FFF2-40B4-BE49-F238E27FC236}">
+                <a16:creationId xmlns:a16="http://schemas.microsoft.com/office/drawing/2014/main" id="{C0E22791-A3A1-4A11-AC36-3945E1BD4B82}"/>
+              </a:ext>
+            </a:extLst>
+          </p:cNvPr>
+          <p:cNvSpPr>
+            <a:spLocks noGrp="1"/>
+          </p:cNvSpPr>
+          <p:nvPr>
+            <p:ph idx="1"/>
+          </p:nvPr>
+        </p:nvSpPr>
+        <p:spPr/>
+        <p:txBody>
+          <a:bodyPr/>
+          <a:lstStyle/>
+          <a:p>
+            <a:endParaRPr lang="en-US"/>
+          </a:p>
+        </p:txBody>
+      </p:sp>
+    </p:spTree>
+    <p:extLst>
+      <p:ext uri="{BB962C8B-B14F-4D97-AF65-F5344CB8AC3E}">
+        <p14:creationId xmlns:p14="http://schemas.microsoft.com/office/powerpoint/2010/main" val="3980975474"/>
       </p:ext>
     </p:extLst>
   </p:cSld>
@@ -8689,8 +8890,12 @@
           <a:lstStyle/>
           <a:p>
             <a:r>
+              <a:rPr lang="en-US" dirty="0" err="1"/>
+              <a:t>SavePosition.CS</a:t>
+            </a:r>
+            <a:r>
               <a:rPr lang="en-US"/>
-              <a:t>Problem</a:t>
+              <a:t> || Problem</a:t>
             </a:r>
             <a:endParaRPr lang="en-US" dirty="0"/>
           </a:p>
@@ -8774,10 +8979,10 @@
       </p:sp>
       <p:pic>
         <p:nvPicPr>
-          <p:cNvPr id="7" name="Picture 6">
+          <p:cNvPr id="6" name="Picture 5">
             <a:extLst>
               <a:ext uri="{FF2B5EF4-FFF2-40B4-BE49-F238E27FC236}">
-                <a16:creationId xmlns:a16="http://schemas.microsoft.com/office/drawing/2014/main" id="{F9406394-3216-47CD-B2BA-2AF0BAB105DD}"/>
+                <a16:creationId xmlns:a16="http://schemas.microsoft.com/office/drawing/2014/main" id="{D17FA3B1-8E6D-41D9-AAB8-B54F0CDFE71D}"/>
               </a:ext>
             </a:extLst>
           </p:cNvPr>
@@ -8794,8 +8999,8 @@
         </p:blipFill>
         <p:spPr>
           <a:xfrm>
-            <a:off x="3739633" y="2387319"/>
-            <a:ext cx="4712734" cy="3029615"/>
+            <a:off x="3476365" y="2340871"/>
+            <a:ext cx="5239269" cy="3122511"/>
           </a:xfrm>
           <a:prstGeom prst="rect">
             <a:avLst/>

</xml_diff>

<commit_message>
Update PlayerControler and Lecture
Update PlayerControler to be clearer
Added PlayerControler.CS to lecture
</commit_message>
<xml_diff>
--- a/Serialization/Lecture.pptx
+++ b/Serialization/Lecture.pptx
@@ -549,6 +549,202 @@
     <p:extLst>
       <p:ext uri="{BB962C8B-B14F-4D97-AF65-F5344CB8AC3E}">
         <p14:creationId xmlns:p14="http://schemas.microsoft.com/office/powerpoint/2010/main" val="1753178092"/>
+      </p:ext>
+    </p:extLst>
+  </p:cSld>
+  <p:clrMapOvr>
+    <a:masterClrMapping/>
+  </p:clrMapOvr>
+</p:notes>
+</file>
+
+<file path=ppt/notesSlides/notesSlide10.xml><?xml version="1.0" encoding="utf-8"?>
+<p:notes xmlns:a="http://schemas.openxmlformats.org/drawingml/2006/main" xmlns:r="http://schemas.openxmlformats.org/officeDocument/2006/relationships" xmlns:p="http://schemas.openxmlformats.org/presentationml/2006/main">
+  <p:cSld>
+    <p:spTree>
+      <p:nvGrpSpPr>
+        <p:cNvPr id="1" name=""/>
+        <p:cNvGrpSpPr/>
+        <p:nvPr/>
+      </p:nvGrpSpPr>
+      <p:grpSpPr>
+        <a:xfrm>
+          <a:off x="0" y="0"/>
+          <a:ext cx="0" cy="0"/>
+          <a:chOff x="0" y="0"/>
+          <a:chExt cx="0" cy="0"/>
+        </a:xfrm>
+      </p:grpSpPr>
+      <p:sp>
+        <p:nvSpPr>
+          <p:cNvPr id="2" name="Slide Image Placeholder 1"/>
+          <p:cNvSpPr>
+            <a:spLocks noGrp="1" noRot="1" noChangeAspect="1"/>
+          </p:cNvSpPr>
+          <p:nvPr>
+            <p:ph type="sldImg"/>
+          </p:nvPr>
+        </p:nvSpPr>
+        <p:spPr/>
+      </p:sp>
+      <p:sp>
+        <p:nvSpPr>
+          <p:cNvPr id="3" name="Notes Placeholder 2"/>
+          <p:cNvSpPr>
+            <a:spLocks noGrp="1"/>
+          </p:cNvSpPr>
+          <p:nvPr>
+            <p:ph type="body" idx="1"/>
+          </p:nvPr>
+        </p:nvSpPr>
+        <p:spPr/>
+        <p:txBody>
+          <a:bodyPr/>
+          <a:lstStyle/>
+          <a:p>
+            <a:r>
+              <a:rPr lang="en-US" dirty="0"/>
+              <a:t>We also have our </a:t>
+            </a:r>
+            <a:r>
+              <a:rPr lang="en-US" dirty="0" err="1"/>
+              <a:t>PlayerController</a:t>
+            </a:r>
+            <a:r>
+              <a:rPr lang="en-US" dirty="0"/>
+              <a:t> script. We want our player to freely be able to move about in order to test our serialization, so we are going to allow the use of arrow keys to place the player wherever we want it, over and over again.</a:t>
+            </a:r>
+          </a:p>
+          <a:p>
+            <a:endParaRPr lang="en-US" dirty="0"/>
+          </a:p>
+          <a:p>
+            <a:r>
+              <a:rPr lang="en-US" dirty="0"/>
+              <a:t>We are utilizing our </a:t>
+            </a:r>
+            <a:r>
+              <a:rPr lang="en-US" dirty="0" err="1"/>
+              <a:t>monobehavior</a:t>
+            </a:r>
+            <a:r>
+              <a:rPr lang="en-US" dirty="0"/>
+              <a:t> here by putting everything inside the Update() method, which will get refreshed every frame.</a:t>
+            </a:r>
+          </a:p>
+          <a:p>
+            <a:endParaRPr lang="en-US" dirty="0"/>
+          </a:p>
+          <a:p>
+            <a:r>
+              <a:rPr lang="en-US" dirty="0"/>
+              <a:t>On line 7 we are declaring our speed as a public float, which is automatically serialized and viewable from within the inspector. </a:t>
+            </a:r>
+          </a:p>
+          <a:p>
+            <a:endParaRPr lang="en-US" dirty="0"/>
+          </a:p>
+          <a:p>
+            <a:r>
+              <a:rPr lang="en-US" dirty="0"/>
+              <a:t>We have our four </a:t>
+            </a:r>
+            <a:r>
+              <a:rPr lang="en-US" dirty="0" err="1"/>
+              <a:t>Input.GetKeys</a:t>
+            </a:r>
+            <a:r>
+              <a:rPr lang="en-US" dirty="0"/>
+              <a:t> declared for the arrow keys, and I’m going to declare a Vector2 called position for each of these. I’m going to go ahead and use a vector2 here rather than a vector3 because I’m going to keep our player off the Z axis with our key inputs for this example.</a:t>
+            </a:r>
+          </a:p>
+          <a:p>
+            <a:endParaRPr lang="en-US" dirty="0"/>
+          </a:p>
+          <a:p>
+            <a:r>
+              <a:rPr lang="en-US" dirty="0"/>
+              <a:t>For the left and right arrow inputs declared on lines 11 and 17, I want to use </a:t>
+            </a:r>
+            <a:r>
+              <a:rPr lang="en-US" dirty="0" err="1"/>
+              <a:t>position.x</a:t>
+            </a:r>
+            <a:r>
+              <a:rPr lang="en-US" dirty="0"/>
+              <a:t> because we want our box to move along the x axis– left and right. </a:t>
+            </a:r>
+            <a:r>
+              <a:rPr lang="en-US" dirty="0" err="1"/>
+              <a:t>Position.x</a:t>
+            </a:r>
+            <a:r>
+              <a:rPr lang="en-US" dirty="0"/>
+              <a:t> will be += to speed when we want it to move in the right, and it will be -= to speed when we want it to move to the left. We’ll then set the value for position equal to </a:t>
+            </a:r>
+            <a:r>
+              <a:rPr lang="en-US" dirty="0" err="1"/>
+              <a:t>transform.position</a:t>
+            </a:r>
+            <a:r>
+              <a:rPr lang="en-US" dirty="0"/>
+              <a:t>, so the player will visibly respond.</a:t>
+            </a:r>
+          </a:p>
+          <a:p>
+            <a:endParaRPr lang="en-US" dirty="0"/>
+          </a:p>
+          <a:p>
+            <a:r>
+              <a:rPr lang="en-US" dirty="0"/>
+              <a:t>Everything is the same for our up and down arrows, however, instead of using </a:t>
+            </a:r>
+            <a:r>
+              <a:rPr lang="en-US" dirty="0" err="1"/>
+              <a:t>position.x</a:t>
+            </a:r>
+            <a:r>
+              <a:rPr lang="en-US" dirty="0"/>
+              <a:t>, we will use </a:t>
+            </a:r>
+            <a:r>
+              <a:rPr lang="en-US" dirty="0" err="1"/>
+              <a:t>position.y</a:t>
+            </a:r>
+            <a:r>
+              <a:rPr lang="en-US" dirty="0"/>
+              <a:t>, so we can move our object along the y axis instead.</a:t>
+            </a:r>
+          </a:p>
+        </p:txBody>
+      </p:sp>
+      <p:sp>
+        <p:nvSpPr>
+          <p:cNvPr id="4" name="Slide Number Placeholder 3"/>
+          <p:cNvSpPr>
+            <a:spLocks noGrp="1"/>
+          </p:cNvSpPr>
+          <p:nvPr>
+            <p:ph type="sldNum" sz="quarter" idx="5"/>
+          </p:nvPr>
+        </p:nvSpPr>
+        <p:spPr/>
+        <p:txBody>
+          <a:bodyPr/>
+          <a:lstStyle/>
+          <a:p>
+            <a:fld id="{926A4D28-551C-4E4A-9CE4-840CFB3B2FC0}" type="slidenum">
+              <a:rPr lang="en-US" smtClean="0"/>
+              <a:t>11</a:t>
+            </a:fld>
+            <a:endParaRPr lang="en-US"/>
+          </a:p>
+        </p:txBody>
+      </p:sp>
+    </p:spTree>
+    <p:extLst>
+      <p:ext uri="{BB962C8B-B14F-4D97-AF65-F5344CB8AC3E}">
+        <p14:creationId xmlns:p14="http://schemas.microsoft.com/office/powerpoint/2010/main" val="568128246"/>
       </p:ext>
     </p:extLst>
   </p:cSld>
@@ -5630,31 +5826,156 @@
           </a:p>
         </p:txBody>
       </p:sp>
-      <p:sp>
-        <p:nvSpPr>
-          <p:cNvPr id="3" name="Content Placeholder 2">
+      <p:pic>
+        <p:nvPicPr>
+          <p:cNvPr id="7" name="Picture 6">
             <a:extLst>
               <a:ext uri="{FF2B5EF4-FFF2-40B4-BE49-F238E27FC236}">
-                <a16:creationId xmlns:a16="http://schemas.microsoft.com/office/drawing/2014/main" id="{C0E22791-A3A1-4A11-AC36-3945E1BD4B82}"/>
+                <a16:creationId xmlns:a16="http://schemas.microsoft.com/office/drawing/2014/main" id="{D08E7428-2848-42D8-B462-474DE4FB9486}"/>
               </a:ext>
             </a:extLst>
           </p:cNvPr>
-          <p:cNvSpPr>
-            <a:spLocks noGrp="1"/>
-          </p:cNvSpPr>
-          <p:nvPr>
-            <p:ph idx="1"/>
-          </p:nvPr>
-        </p:nvSpPr>
-        <p:spPr/>
-        <p:txBody>
-          <a:bodyPr/>
-          <a:lstStyle/>
-          <a:p>
-            <a:endParaRPr lang="en-US"/>
-          </a:p>
-        </p:txBody>
-      </p:sp>
+          <p:cNvPicPr>
+            <a:picLocks noChangeAspect="1"/>
+          </p:cNvPicPr>
+          <p:nvPr/>
+        </p:nvPicPr>
+        <p:blipFill>
+          <a:blip r:embed="rId3"/>
+          <a:stretch>
+            <a:fillRect/>
+          </a:stretch>
+        </p:blipFill>
+        <p:spPr>
+          <a:xfrm>
+            <a:off x="991830" y="1431515"/>
+            <a:ext cx="4572000" cy="4514850"/>
+          </a:xfrm>
+          <a:prstGeom prst="rect">
+            <a:avLst/>
+          </a:prstGeom>
+        </p:spPr>
+      </p:pic>
+      <p:pic>
+        <p:nvPicPr>
+          <p:cNvPr id="9" name="Picture 8">
+            <a:extLst>
+              <a:ext uri="{FF2B5EF4-FFF2-40B4-BE49-F238E27FC236}">
+                <a16:creationId xmlns:a16="http://schemas.microsoft.com/office/drawing/2014/main" id="{9F4D3DF1-5B58-4275-A302-3D61CE2E351D}"/>
+              </a:ext>
+            </a:extLst>
+          </p:cNvPr>
+          <p:cNvPicPr>
+            <a:picLocks noChangeAspect="1"/>
+          </p:cNvPicPr>
+          <p:nvPr/>
+        </p:nvPicPr>
+        <p:blipFill>
+          <a:blip r:embed="rId4"/>
+          <a:stretch>
+            <a:fillRect/>
+          </a:stretch>
+        </p:blipFill>
+        <p:spPr>
+          <a:xfrm>
+            <a:off x="7414852" y="1622323"/>
+            <a:ext cx="4305300" cy="2390775"/>
+          </a:xfrm>
+          <a:prstGeom prst="rect">
+            <a:avLst/>
+          </a:prstGeom>
+        </p:spPr>
+      </p:pic>
+      <p:sp>
+        <p:nvSpPr>
+          <p:cNvPr id="10" name="TextBox 9">
+            <a:extLst>
+              <a:ext uri="{FF2B5EF4-FFF2-40B4-BE49-F238E27FC236}">
+                <a16:creationId xmlns:a16="http://schemas.microsoft.com/office/drawing/2014/main" id="{A7AE3ACB-85D0-4812-979E-3B707CF95321}"/>
+              </a:ext>
+            </a:extLst>
+          </p:cNvPr>
+          <p:cNvSpPr txBox="1"/>
+          <p:nvPr/>
+        </p:nvSpPr>
+        <p:spPr>
+          <a:xfrm>
+            <a:off x="8037871" y="6238800"/>
+            <a:ext cx="3967317" cy="369332"/>
+          </a:xfrm>
+          <a:prstGeom prst="rect">
+            <a:avLst/>
+          </a:prstGeom>
+          <a:solidFill>
+            <a:schemeClr val="accent2"/>
+          </a:solidFill>
+        </p:spPr>
+        <p:txBody>
+          <a:bodyPr wrap="square" rtlCol="0">
+            <a:spAutoFit/>
+          </a:bodyPr>
+          <a:lstStyle/>
+          <a:p>
+            <a:r>
+              <a:rPr lang="en-US" dirty="0"/>
+              <a:t>Assets/Scripts/</a:t>
+            </a:r>
+            <a:r>
+              <a:rPr lang="en-US" b="1" dirty="0" err="1"/>
+              <a:t>PlayerController.CS</a:t>
+            </a:r>
+            <a:endParaRPr lang="en-US" b="1" dirty="0"/>
+          </a:p>
+        </p:txBody>
+      </p:sp>
+      <p:cxnSp>
+        <p:nvCxnSpPr>
+          <p:cNvPr id="15" name="Connector: Elbow 14">
+            <a:extLst>
+              <a:ext uri="{FF2B5EF4-FFF2-40B4-BE49-F238E27FC236}">
+                <a16:creationId xmlns:a16="http://schemas.microsoft.com/office/drawing/2014/main" id="{5DCF87BD-A2DE-48CB-9658-3256C6168010}"/>
+              </a:ext>
+            </a:extLst>
+          </p:cNvPr>
+          <p:cNvCxnSpPr>
+            <a:cxnSpLocks/>
+            <a:stCxn id="7" idx="2"/>
+            <a:endCxn id="9" idx="0"/>
+          </p:cNvCxnSpPr>
+          <p:nvPr/>
+        </p:nvCxnSpPr>
+        <p:spPr>
+          <a:xfrm rot="5400000" flipH="1" flipV="1">
+            <a:off x="4260645" y="639508"/>
+            <a:ext cx="4324042" cy="6289672"/>
+          </a:xfrm>
+          <a:prstGeom prst="bentConnector5">
+            <a:avLst>
+              <a:gd name="adj1" fmla="val -12791"/>
+              <a:gd name="adj2" fmla="val 51060"/>
+              <a:gd name="adj3" fmla="val 112109"/>
+            </a:avLst>
+          </a:prstGeom>
+          <a:ln w="76200">
+            <a:headEnd type="triangle"/>
+            <a:tailEnd type="triangle"/>
+          </a:ln>
+        </p:spPr>
+        <p:style>
+          <a:lnRef idx="1">
+            <a:schemeClr val="accent1"/>
+          </a:lnRef>
+          <a:fillRef idx="0">
+            <a:schemeClr val="accent1"/>
+          </a:fillRef>
+          <a:effectRef idx="0">
+            <a:schemeClr val="accent1"/>
+          </a:effectRef>
+          <a:fontRef idx="minor">
+            <a:schemeClr val="tx1"/>
+          </a:fontRef>
+        </p:style>
+      </p:cxnSp>
     </p:spTree>
     <p:extLst>
       <p:ext uri="{BB962C8B-B14F-4D97-AF65-F5344CB8AC3E}">
@@ -8894,10 +9215,9 @@
               <a:t>SavePosition.CS</a:t>
             </a:r>
             <a:r>
-              <a:rPr lang="en-US"/>
+              <a:rPr lang="en-US" dirty="0"/>
               <a:t> || Problem</a:t>
             </a:r>
-            <a:endParaRPr lang="en-US" dirty="0"/>
           </a:p>
         </p:txBody>
       </p:sp>

</xml_diff>